<commit_message>
added som abstract and sct and some minor changes
</commit_message>
<xml_diff>
--- a/Thesis/arch.pptx
+++ b/Thesis/arch.pptx
@@ -11,6 +11,7 @@
     <p:sldId id="259" r:id="rId5"/>
     <p:sldId id="260" r:id="rId6"/>
     <p:sldId id="261" r:id="rId7"/>
+    <p:sldId id="262" r:id="rId8"/>
   </p:sldIdLst>
   <p:sldSz cx="9144000" cy="6858000" type="screen4x3"/>
   <p:notesSz cx="6858000" cy="9144000"/>
@@ -263,11 +264,11 @@
             </c:numRef>
           </c:val>
         </c:ser>
-        <c:axId val="110762808"/>
-        <c:axId val="110343016"/>
+        <c:axId val="484616712"/>
+        <c:axId val="484623912"/>
       </c:barChart>
       <c:catAx>
-        <c:axId val="110762808"/>
+        <c:axId val="484616712"/>
         <c:scaling>
           <c:orientation val="minMax"/>
         </c:scaling>
@@ -291,14 +292,14 @@
           <c:layout/>
         </c:title>
         <c:tickLblPos val="nextTo"/>
-        <c:crossAx val="110343016"/>
+        <c:crossAx val="484623912"/>
         <c:crosses val="autoZero"/>
         <c:auto val="1"/>
         <c:lblAlgn val="ctr"/>
         <c:lblOffset val="100"/>
       </c:catAx>
       <c:valAx>
-        <c:axId val="110343016"/>
+        <c:axId val="484623912"/>
         <c:scaling>
           <c:orientation val="minMax"/>
         </c:scaling>
@@ -324,7 +325,7 @@
         </c:title>
         <c:numFmt formatCode="General" sourceLinked="1"/>
         <c:tickLblPos val="nextTo"/>
-        <c:crossAx val="110762808"/>
+        <c:crossAx val="484616712"/>
         <c:crosses val="autoZero"/>
         <c:crossBetween val="between"/>
       </c:valAx>
@@ -3391,7 +3392,7 @@
             <a:fld id="{E861DE41-929C-F344-8FB3-659D3F84A00A}" type="datetimeFigureOut">
               <a:rPr lang="en-US" smtClean="0"/>
               <a:pPr/>
-              <a:t>10/13/10</a:t>
+              <a:t>10/27/10</a:t>
             </a:fld>
             <a:endParaRPr lang="en-US"/>
           </a:p>
@@ -3558,7 +3559,7 @@
             <a:fld id="{E861DE41-929C-F344-8FB3-659D3F84A00A}" type="datetimeFigureOut">
               <a:rPr lang="en-US" smtClean="0"/>
               <a:pPr/>
-              <a:t>10/13/10</a:t>
+              <a:t>10/27/10</a:t>
             </a:fld>
             <a:endParaRPr lang="en-US"/>
           </a:p>
@@ -3735,7 +3736,7 @@
             <a:fld id="{E861DE41-929C-F344-8FB3-659D3F84A00A}" type="datetimeFigureOut">
               <a:rPr lang="en-US" smtClean="0"/>
               <a:pPr/>
-              <a:t>10/13/10</a:t>
+              <a:t>10/27/10</a:t>
             </a:fld>
             <a:endParaRPr lang="en-US"/>
           </a:p>
@@ -3902,7 +3903,7 @@
             <a:fld id="{E861DE41-929C-F344-8FB3-659D3F84A00A}" type="datetimeFigureOut">
               <a:rPr lang="en-US" smtClean="0"/>
               <a:pPr/>
-              <a:t>10/13/10</a:t>
+              <a:t>10/27/10</a:t>
             </a:fld>
             <a:endParaRPr lang="en-US"/>
           </a:p>
@@ -4145,7 +4146,7 @@
             <a:fld id="{E861DE41-929C-F344-8FB3-659D3F84A00A}" type="datetimeFigureOut">
               <a:rPr lang="en-US" smtClean="0"/>
               <a:pPr/>
-              <a:t>10/13/10</a:t>
+              <a:t>10/27/10</a:t>
             </a:fld>
             <a:endParaRPr lang="en-US"/>
           </a:p>
@@ -4430,7 +4431,7 @@
             <a:fld id="{E861DE41-929C-F344-8FB3-659D3F84A00A}" type="datetimeFigureOut">
               <a:rPr lang="en-US" smtClean="0"/>
               <a:pPr/>
-              <a:t>10/13/10</a:t>
+              <a:t>10/27/10</a:t>
             </a:fld>
             <a:endParaRPr lang="en-US"/>
           </a:p>
@@ -4849,7 +4850,7 @@
             <a:fld id="{E861DE41-929C-F344-8FB3-659D3F84A00A}" type="datetimeFigureOut">
               <a:rPr lang="en-US" smtClean="0"/>
               <a:pPr/>
-              <a:t>10/13/10</a:t>
+              <a:t>10/27/10</a:t>
             </a:fld>
             <a:endParaRPr lang="en-US"/>
           </a:p>
@@ -4964,7 +4965,7 @@
             <a:fld id="{E861DE41-929C-F344-8FB3-659D3F84A00A}" type="datetimeFigureOut">
               <a:rPr lang="en-US" smtClean="0"/>
               <a:pPr/>
-              <a:t>10/13/10</a:t>
+              <a:t>10/27/10</a:t>
             </a:fld>
             <a:endParaRPr lang="en-US"/>
           </a:p>
@@ -5056,7 +5057,7 @@
             <a:fld id="{E861DE41-929C-F344-8FB3-659D3F84A00A}" type="datetimeFigureOut">
               <a:rPr lang="en-US" smtClean="0"/>
               <a:pPr/>
-              <a:t>10/13/10</a:t>
+              <a:t>10/27/10</a:t>
             </a:fld>
             <a:endParaRPr lang="en-US"/>
           </a:p>
@@ -5330,7 +5331,7 @@
             <a:fld id="{E861DE41-929C-F344-8FB3-659D3F84A00A}" type="datetimeFigureOut">
               <a:rPr lang="en-US" smtClean="0"/>
               <a:pPr/>
-              <a:t>10/13/10</a:t>
+              <a:t>10/27/10</a:t>
             </a:fld>
             <a:endParaRPr lang="en-US"/>
           </a:p>
@@ -5580,7 +5581,7 @@
             <a:fld id="{E861DE41-929C-F344-8FB3-659D3F84A00A}" type="datetimeFigureOut">
               <a:rPr lang="en-US" smtClean="0"/>
               <a:pPr/>
-              <a:t>10/13/10</a:t>
+              <a:t>10/27/10</a:t>
             </a:fld>
             <a:endParaRPr lang="en-US"/>
           </a:p>
@@ -5790,7 +5791,7 @@
             <a:fld id="{E861DE41-929C-F344-8FB3-659D3F84A00A}" type="datetimeFigureOut">
               <a:rPr lang="en-US" smtClean="0"/>
               <a:pPr/>
-              <a:t>10/13/10</a:t>
+              <a:t>10/27/10</a:t>
             </a:fld>
             <a:endParaRPr lang="en-US"/>
           </a:p>
@@ -8517,6 +8518,99 @@
 </p:sld>
 </file>
 
+<file path=ppt/slides/slide7.xml><?xml version="1.0" encoding="utf-8"?>
+<p:sld xmlns:a="http://schemas.openxmlformats.org/drawingml/2006/main" xmlns:r="http://schemas.openxmlformats.org/officeDocument/2006/relationships" xmlns:mc="http://schemas.openxmlformats.org/markup-compatibility/2006" xmlns:mv="urn:schemas-microsoft-com:mac:vml" xmlns:p="http://schemas.openxmlformats.org/presentationml/2006/main" mc:Ignorable="mv" mc:PreserveAttributes="mv:*">
+  <p:cSld>
+    <p:spTree>
+      <p:nvGrpSpPr>
+        <p:cNvPr id="1" name=""/>
+        <p:cNvGrpSpPr/>
+        <p:nvPr/>
+      </p:nvGrpSpPr>
+      <p:grpSpPr>
+        <a:xfrm>
+          <a:off x="0" y="0"/>
+          <a:ext cx="0" cy="0"/>
+          <a:chOff x="0" y="0"/>
+          <a:chExt cx="0" cy="0"/>
+        </a:xfrm>
+      </p:grpSpPr>
+      <p:pic>
+        <p:nvPicPr>
+          <p:cNvPr id="6" name="Picture 5" descr="Picture 7.png"/>
+          <p:cNvPicPr>
+            <a:picLocks noChangeAspect="1"/>
+          </p:cNvPicPr>
+          <p:nvPr/>
+        </p:nvPicPr>
+        <p:blipFill>
+          <a:blip r:embed="rId2"/>
+          <a:stretch>
+            <a:fillRect/>
+          </a:stretch>
+        </p:blipFill>
+        <p:spPr>
+          <a:xfrm>
+            <a:off x="1066800" y="1447800"/>
+            <a:ext cx="6705601" cy="3771900"/>
+          </a:xfrm>
+          <a:prstGeom prst="rect">
+            <a:avLst/>
+          </a:prstGeom>
+        </p:spPr>
+      </p:pic>
+      <p:sp>
+        <p:nvSpPr>
+          <p:cNvPr id="7" name="Rectangle 6"/>
+          <p:cNvSpPr/>
+          <p:nvPr/>
+        </p:nvSpPr>
+        <p:spPr>
+          <a:xfrm>
+            <a:off x="1447800" y="2819400"/>
+            <a:ext cx="5943600" cy="228600"/>
+          </a:xfrm>
+          <a:prstGeom prst="rect">
+            <a:avLst/>
+          </a:prstGeom>
+          <a:noFill/>
+          <a:ln w="38100" cmpd="sng">
+            <a:solidFill>
+              <a:srgbClr val="FF0000"/>
+            </a:solidFill>
+          </a:ln>
+        </p:spPr>
+        <p:style>
+          <a:lnRef idx="1">
+            <a:schemeClr val="accent1"/>
+          </a:lnRef>
+          <a:fillRef idx="3">
+            <a:schemeClr val="accent1"/>
+          </a:fillRef>
+          <a:effectRef idx="2">
+            <a:schemeClr val="accent1"/>
+          </a:effectRef>
+          <a:fontRef idx="minor">
+            <a:schemeClr val="lt1"/>
+          </a:fontRef>
+        </p:style>
+        <p:txBody>
+          <a:bodyPr rtlCol="0" anchor="ctr"/>
+          <a:lstStyle/>
+          <a:p>
+            <a:pPr algn="ctr"/>
+            <a:endParaRPr lang="en-US"/>
+          </a:p>
+        </p:txBody>
+      </p:sp>
+    </p:spTree>
+  </p:cSld>
+  <p:clrMapOvr>
+    <a:masterClrMapping/>
+  </p:clrMapOvr>
+</p:sld>
+</file>
+
 <file path=ppt/theme/theme1.xml><?xml version="1.0" encoding="utf-8"?>
 <a:theme xmlns:a="http://schemas.openxmlformats.org/drawingml/2006/main" name="Office Theme">
   <a:themeElements>

</xml_diff>

<commit_message>
changed some text abxt
</commit_message>
<xml_diff>
--- a/Thesis/arch.pptx
+++ b/Thesis/arch.pptx
@@ -11498,7 +11498,7 @@
         <p:spPr>
           <a:xfrm>
             <a:off x="1066800" y="2590800"/>
-            <a:ext cx="4800600" cy="1213322"/>
+            <a:ext cx="4800600" cy="685800"/>
           </a:xfrm>
           <a:prstGeom prst="rect">
             <a:avLst/>
@@ -11568,8 +11568,8 @@
         </p:nvSpPr>
         <p:spPr>
           <a:xfrm>
-            <a:off x="1066800" y="4349278"/>
-            <a:ext cx="4800600" cy="1213322"/>
+            <a:off x="1066800" y="3968278"/>
+            <a:ext cx="4800600" cy="756122"/>
           </a:xfrm>
           <a:prstGeom prst="rect">
             <a:avLst/>
@@ -11634,13 +11634,16 @@
       <p:cxnSp>
         <p:nvCxnSpPr>
           <p:cNvPr id="13" name="Straight Connector 12"/>
-          <p:cNvCxnSpPr/>
+          <p:cNvCxnSpPr>
+            <a:stCxn id="6" idx="2"/>
+            <a:endCxn id="7" idx="0"/>
+          </p:cNvCxnSpPr>
           <p:nvPr/>
         </p:nvCxnSpPr>
         <p:spPr>
           <a:xfrm rot="5400000">
-            <a:off x="3195873" y="4072967"/>
-            <a:ext cx="539278" cy="1588"/>
+            <a:off x="3121261" y="3622439"/>
+            <a:ext cx="691678" cy="1588"/>
           </a:xfrm>
           <a:prstGeom prst="line">
             <a:avLst/>
@@ -11675,14 +11678,14 @@
         </p:nvCxnSpPr>
         <p:spPr>
           <a:xfrm rot="5400000" flipH="1">
-            <a:off x="1981200" y="4076700"/>
-            <a:ext cx="2971800" cy="1588"/>
+            <a:off x="2400300" y="3657600"/>
+            <a:ext cx="2133600" cy="1588"/>
           </a:xfrm>
           <a:prstGeom prst="bentConnector5">
             <a:avLst>
-              <a:gd name="adj1" fmla="val -14078"/>
-              <a:gd name="adj2" fmla="val -175507746"/>
-              <a:gd name="adj3" fmla="val 116535"/>
+              <a:gd name="adj1" fmla="val -18241"/>
+              <a:gd name="adj2" fmla="val -171830605"/>
+              <a:gd name="adj3" fmla="val 120294"/>
             </a:avLst>
           </a:prstGeom>
           <a:ln>

</xml_diff>